<commit_message>
feat: Add Python MCP server and Android app
- Replace TypeScript MCP server with pure Python implementation
- Add comprehensive Android WebView application for mobile access
- Update dependencies to use Python-only libraries (aiohttp, lxml)
- Create automated build scripts for both MCP server and Android APK
- Update documentation and README with new Python-based architecture
- Maintain all existing functionality while eliminating Node.js dependencies
- Add mobile-optimized UI with native file download capabilities
- Include detailed setup and deployment instructions
</commit_message>
<xml_diff>
--- a/seminar_presentation.pptx
+++ b/seminar_presentation.pptx
@@ -5,16 +5,16 @@
     <p:sldMasterId id="2147483648" r:id="rId1"/>
   </p:sldMasterIdLst>
   <p:sldIdLst>
-    <p:sldId id="256" r:id="rId2"/>
-    <p:sldId id="257" r:id="rId3"/>
-    <p:sldId id="258" r:id="rId4"/>
-    <p:sldId id="259" r:id="rId5"/>
-    <p:sldId id="260" r:id="rId6"/>
-    <p:sldId id="261" r:id="rId7"/>
-    <p:sldId id="262" r:id="rId8"/>
-    <p:sldId id="263" r:id="rId9"/>
-    <p:sldId id="264" r:id="rId10"/>
-    <p:sldId id="265" r:id="rId11"/>
+    <p:sldId id="256" r:id="rId7"/>
+    <p:sldId id="257" r:id="rId8"/>
+    <p:sldId id="258" r:id="rId9"/>
+    <p:sldId id="259" r:id="rId10"/>
+    <p:sldId id="260" r:id="rId11"/>
+    <p:sldId id="261" r:id="rId12"/>
+    <p:sldId id="262" r:id="rId13"/>
+    <p:sldId id="263" r:id="rId14"/>
+    <p:sldId id="264" r:id="rId15"/>
+    <p:sldId id="265" r:id="rId16"/>
   </p:sldIdLst>
   <p:sldSz cx="9144000" cy="6858000" type="screen4x3"/>
   <p:notesSz cx="6858000" cy="9144000"/>
@@ -113,22 +113,6 @@
       </a:defRPr>
     </a:lvl9pPr>
   </p:defaultTextStyle>
-  <p:extLst>
-    <p:ext uri="{EFAFB233-063F-42B5-8137-9DF3F51BA10A}">
-      <p15:sldGuideLst xmlns:p15="http://schemas.microsoft.com/office/powerpoint/2012/main">
-        <p15:guide id="1" orient="horz" pos="2160">
-          <p15:clr>
-            <a:srgbClr val="A4A3A4"/>
-          </p15:clr>
-        </p15:guide>
-        <p15:guide id="2" pos="2880">
-          <p15:clr>
-            <a:srgbClr val="A4A3A4"/>
-          </p15:clr>
-        </p15:guide>
-      </p15:sldGuideLst>
-    </p:ext>
-  </p:extLst>
 </p:presentation>
 </file>
 
@@ -170,9 +154,10 @@
           <a:lstStyle/>
           <a:p>
             <a:r>
-              <a:rPr lang="en-US"/>
+              <a:rPr lang="en-US" smtClean="0"/>
               <a:t>Click to edit Master title style</a:t>
             </a:r>
+            <a:endParaRPr lang="en-US"/>
           </a:p>
         </p:txBody>
       </p:sp>
@@ -288,9 +273,10 @@
           </a:lstStyle>
           <a:p>
             <a:r>
-              <a:rPr lang="en-US"/>
+              <a:rPr lang="en-US" smtClean="0"/>
               <a:t>Click to edit Master subtitle style</a:t>
             </a:r>
+            <a:endParaRPr lang="en-US"/>
           </a:p>
         </p:txBody>
       </p:sp>
@@ -311,7 +297,7 @@
           <a:p>
             <a:fld id="{5BCAD085-E8A6-8845-BD4E-CB4CCA059FC4}" type="datetimeFigureOut">
               <a:rPr lang="en-US" smtClean="0"/>
-              <a:t>10/24/2025</a:t>
+              <a:t>1/27/13</a:t>
             </a:fld>
             <a:endParaRPr lang="en-US"/>
           </a:p>
@@ -405,9 +391,10 @@
           <a:lstStyle/>
           <a:p>
             <a:r>
-              <a:rPr lang="en-US"/>
+              <a:rPr lang="en-US" smtClean="0"/>
               <a:t>Click to edit Master title style</a:t>
             </a:r>
+            <a:endParaRPr lang="en-US"/>
           </a:p>
         </p:txBody>
       </p:sp>
@@ -428,37 +415,38 @@
           <a:p>
             <a:pPr lvl="0"/>
             <a:r>
-              <a:rPr lang="en-US"/>
+              <a:rPr lang="en-US" smtClean="0"/>
               <a:t>Click to edit Master text styles</a:t>
             </a:r>
           </a:p>
           <a:p>
             <a:pPr lvl="1"/>
             <a:r>
-              <a:rPr lang="en-US"/>
+              <a:rPr lang="en-US" smtClean="0"/>
               <a:t>Second level</a:t>
             </a:r>
           </a:p>
           <a:p>
             <a:pPr lvl="2"/>
             <a:r>
-              <a:rPr lang="en-US"/>
+              <a:rPr lang="en-US" smtClean="0"/>
               <a:t>Third level</a:t>
             </a:r>
           </a:p>
           <a:p>
             <a:pPr lvl="3"/>
             <a:r>
-              <a:rPr lang="en-US"/>
+              <a:rPr lang="en-US" smtClean="0"/>
               <a:t>Fourth level</a:t>
             </a:r>
           </a:p>
           <a:p>
             <a:pPr lvl="4"/>
             <a:r>
-              <a:rPr lang="en-US"/>
+              <a:rPr lang="en-US" smtClean="0"/>
               <a:t>Fifth level</a:t>
             </a:r>
+            <a:endParaRPr lang="en-US"/>
           </a:p>
         </p:txBody>
       </p:sp>
@@ -479,7 +467,7 @@
           <a:p>
             <a:fld id="{5BCAD085-E8A6-8845-BD4E-CB4CCA059FC4}" type="datetimeFigureOut">
               <a:rPr lang="en-US" smtClean="0"/>
-              <a:t>10/24/2025</a:t>
+              <a:t>1/27/13</a:t>
             </a:fld>
             <a:endParaRPr lang="en-US"/>
           </a:p>
@@ -578,9 +566,10 @@
           <a:lstStyle/>
           <a:p>
             <a:r>
-              <a:rPr lang="en-US"/>
+              <a:rPr lang="en-US" smtClean="0"/>
               <a:t>Click to edit Master title style</a:t>
             </a:r>
+            <a:endParaRPr lang="en-US"/>
           </a:p>
         </p:txBody>
       </p:sp>
@@ -606,37 +595,38 @@
           <a:p>
             <a:pPr lvl="0"/>
             <a:r>
-              <a:rPr lang="en-US"/>
+              <a:rPr lang="en-US" smtClean="0"/>
               <a:t>Click to edit Master text styles</a:t>
             </a:r>
           </a:p>
           <a:p>
             <a:pPr lvl="1"/>
             <a:r>
-              <a:rPr lang="en-US"/>
+              <a:rPr lang="en-US" smtClean="0"/>
               <a:t>Second level</a:t>
             </a:r>
           </a:p>
           <a:p>
             <a:pPr lvl="2"/>
             <a:r>
-              <a:rPr lang="en-US"/>
+              <a:rPr lang="en-US" smtClean="0"/>
               <a:t>Third level</a:t>
             </a:r>
           </a:p>
           <a:p>
             <a:pPr lvl="3"/>
             <a:r>
-              <a:rPr lang="en-US"/>
+              <a:rPr lang="en-US" smtClean="0"/>
               <a:t>Fourth level</a:t>
             </a:r>
           </a:p>
           <a:p>
             <a:pPr lvl="4"/>
             <a:r>
-              <a:rPr lang="en-US"/>
+              <a:rPr lang="en-US" smtClean="0"/>
               <a:t>Fifth level</a:t>
             </a:r>
+            <a:endParaRPr lang="en-US"/>
           </a:p>
         </p:txBody>
       </p:sp>
@@ -657,7 +647,7 @@
           <a:p>
             <a:fld id="{5BCAD085-E8A6-8845-BD4E-CB4CCA059FC4}" type="datetimeFigureOut">
               <a:rPr lang="en-US" smtClean="0"/>
-              <a:t>10/24/2025</a:t>
+              <a:t>1/27/13</a:t>
             </a:fld>
             <a:endParaRPr lang="en-US"/>
           </a:p>
@@ -751,9 +741,10 @@
           <a:lstStyle/>
           <a:p>
             <a:r>
-              <a:rPr lang="en-US"/>
+              <a:rPr lang="en-US" smtClean="0"/>
               <a:t>Click to edit Master title style</a:t>
             </a:r>
+            <a:endParaRPr lang="en-US"/>
           </a:p>
         </p:txBody>
       </p:sp>
@@ -774,37 +765,38 @@
           <a:p>
             <a:pPr lvl="0"/>
             <a:r>
-              <a:rPr lang="en-US"/>
+              <a:rPr lang="en-US" smtClean="0"/>
               <a:t>Click to edit Master text styles</a:t>
             </a:r>
           </a:p>
           <a:p>
             <a:pPr lvl="1"/>
             <a:r>
-              <a:rPr lang="en-US"/>
+              <a:rPr lang="en-US" smtClean="0"/>
               <a:t>Second level</a:t>
             </a:r>
           </a:p>
           <a:p>
             <a:pPr lvl="2"/>
             <a:r>
-              <a:rPr lang="en-US"/>
+              <a:rPr lang="en-US" smtClean="0"/>
               <a:t>Third level</a:t>
             </a:r>
           </a:p>
           <a:p>
             <a:pPr lvl="3"/>
             <a:r>
-              <a:rPr lang="en-US"/>
+              <a:rPr lang="en-US" smtClean="0"/>
               <a:t>Fourth level</a:t>
             </a:r>
           </a:p>
           <a:p>
             <a:pPr lvl="4"/>
             <a:r>
-              <a:rPr lang="en-US"/>
+              <a:rPr lang="en-US" smtClean="0"/>
               <a:t>Fifth level</a:t>
             </a:r>
+            <a:endParaRPr lang="en-US"/>
           </a:p>
         </p:txBody>
       </p:sp>
@@ -825,7 +817,7 @@
           <a:p>
             <a:fld id="{5BCAD085-E8A6-8845-BD4E-CB4CCA059FC4}" type="datetimeFigureOut">
               <a:rPr lang="en-US" smtClean="0"/>
-              <a:t>10/24/2025</a:t>
+              <a:t>1/27/13</a:t>
             </a:fld>
             <a:endParaRPr lang="en-US"/>
           </a:p>
@@ -928,9 +920,10 @@
           </a:lstStyle>
           <a:p>
             <a:r>
-              <a:rPr lang="en-US"/>
+              <a:rPr lang="en-US" smtClean="0"/>
               <a:t>Click to edit Master title style</a:t>
             </a:r>
+            <a:endParaRPr lang="en-US"/>
           </a:p>
         </p:txBody>
       </p:sp>
@@ -1047,7 +1040,7 @@
           <a:p>
             <a:pPr lvl="0"/>
             <a:r>
-              <a:rPr lang="en-US"/>
+              <a:rPr lang="en-US" smtClean="0"/>
               <a:t>Click to edit Master text styles</a:t>
             </a:r>
           </a:p>
@@ -1070,7 +1063,7 @@
           <a:p>
             <a:fld id="{5BCAD085-E8A6-8845-BD4E-CB4CCA059FC4}" type="datetimeFigureOut">
               <a:rPr lang="en-US" smtClean="0"/>
-              <a:t>10/24/2025</a:t>
+              <a:t>1/27/13</a:t>
             </a:fld>
             <a:endParaRPr lang="en-US"/>
           </a:p>
@@ -1164,9 +1157,10 @@
           <a:lstStyle/>
           <a:p>
             <a:r>
-              <a:rPr lang="en-US"/>
+              <a:rPr lang="en-US" smtClean="0"/>
               <a:t>Click to edit Master title style</a:t>
             </a:r>
+            <a:endParaRPr lang="en-US"/>
           </a:p>
         </p:txBody>
       </p:sp>
@@ -1220,37 +1214,38 @@
           <a:p>
             <a:pPr lvl="0"/>
             <a:r>
-              <a:rPr lang="en-US"/>
+              <a:rPr lang="en-US" smtClean="0"/>
               <a:t>Click to edit Master text styles</a:t>
             </a:r>
           </a:p>
           <a:p>
             <a:pPr lvl="1"/>
             <a:r>
-              <a:rPr lang="en-US"/>
+              <a:rPr lang="en-US" smtClean="0"/>
               <a:t>Second level</a:t>
             </a:r>
           </a:p>
           <a:p>
             <a:pPr lvl="2"/>
             <a:r>
-              <a:rPr lang="en-US"/>
+              <a:rPr lang="en-US" smtClean="0"/>
               <a:t>Third level</a:t>
             </a:r>
           </a:p>
           <a:p>
             <a:pPr lvl="3"/>
             <a:r>
-              <a:rPr lang="en-US"/>
+              <a:rPr lang="en-US" smtClean="0"/>
               <a:t>Fourth level</a:t>
             </a:r>
           </a:p>
           <a:p>
             <a:pPr lvl="4"/>
             <a:r>
-              <a:rPr lang="en-US"/>
+              <a:rPr lang="en-US" smtClean="0"/>
               <a:t>Fifth level</a:t>
             </a:r>
+            <a:endParaRPr lang="en-US"/>
           </a:p>
         </p:txBody>
       </p:sp>
@@ -1304,37 +1299,38 @@
           <a:p>
             <a:pPr lvl="0"/>
             <a:r>
-              <a:rPr lang="en-US"/>
+              <a:rPr lang="en-US" smtClean="0"/>
               <a:t>Click to edit Master text styles</a:t>
             </a:r>
           </a:p>
           <a:p>
             <a:pPr lvl="1"/>
             <a:r>
-              <a:rPr lang="en-US"/>
+              <a:rPr lang="en-US" smtClean="0"/>
               <a:t>Second level</a:t>
             </a:r>
           </a:p>
           <a:p>
             <a:pPr lvl="2"/>
             <a:r>
-              <a:rPr lang="en-US"/>
+              <a:rPr lang="en-US" smtClean="0"/>
               <a:t>Third level</a:t>
             </a:r>
           </a:p>
           <a:p>
             <a:pPr lvl="3"/>
             <a:r>
-              <a:rPr lang="en-US"/>
+              <a:rPr lang="en-US" smtClean="0"/>
               <a:t>Fourth level</a:t>
             </a:r>
           </a:p>
           <a:p>
             <a:pPr lvl="4"/>
             <a:r>
-              <a:rPr lang="en-US"/>
+              <a:rPr lang="en-US" smtClean="0"/>
               <a:t>Fifth level</a:t>
             </a:r>
+            <a:endParaRPr lang="en-US"/>
           </a:p>
         </p:txBody>
       </p:sp>
@@ -1355,7 +1351,7 @@
           <a:p>
             <a:fld id="{5BCAD085-E8A6-8845-BD4E-CB4CCA059FC4}" type="datetimeFigureOut">
               <a:rPr lang="en-US" smtClean="0"/>
-              <a:t>10/24/2025</a:t>
+              <a:t>1/27/13</a:t>
             </a:fld>
             <a:endParaRPr lang="en-US"/>
           </a:p>
@@ -1453,9 +1449,10 @@
           </a:lstStyle>
           <a:p>
             <a:r>
-              <a:rPr lang="en-US"/>
+              <a:rPr lang="en-US" smtClean="0"/>
               <a:t>Click to edit Master title style</a:t>
             </a:r>
+            <a:endParaRPr lang="en-US"/>
           </a:p>
         </p:txBody>
       </p:sp>
@@ -1518,7 +1515,7 @@
           <a:p>
             <a:pPr lvl="0"/>
             <a:r>
-              <a:rPr lang="en-US"/>
+              <a:rPr lang="en-US" smtClean="0"/>
               <a:t>Click to edit Master text styles</a:t>
             </a:r>
           </a:p>
@@ -1574,37 +1571,38 @@
           <a:p>
             <a:pPr lvl="0"/>
             <a:r>
-              <a:rPr lang="en-US"/>
+              <a:rPr lang="en-US" smtClean="0"/>
               <a:t>Click to edit Master text styles</a:t>
             </a:r>
           </a:p>
           <a:p>
             <a:pPr lvl="1"/>
             <a:r>
-              <a:rPr lang="en-US"/>
+              <a:rPr lang="en-US" smtClean="0"/>
               <a:t>Second level</a:t>
             </a:r>
           </a:p>
           <a:p>
             <a:pPr lvl="2"/>
             <a:r>
-              <a:rPr lang="en-US"/>
+              <a:rPr lang="en-US" smtClean="0"/>
               <a:t>Third level</a:t>
             </a:r>
           </a:p>
           <a:p>
             <a:pPr lvl="3"/>
             <a:r>
-              <a:rPr lang="en-US"/>
+              <a:rPr lang="en-US" smtClean="0"/>
               <a:t>Fourth level</a:t>
             </a:r>
           </a:p>
           <a:p>
             <a:pPr lvl="4"/>
             <a:r>
-              <a:rPr lang="en-US"/>
+              <a:rPr lang="en-US" smtClean="0"/>
               <a:t>Fifth level</a:t>
             </a:r>
+            <a:endParaRPr lang="en-US"/>
           </a:p>
         </p:txBody>
       </p:sp>
@@ -1667,7 +1665,7 @@
           <a:p>
             <a:pPr lvl="0"/>
             <a:r>
-              <a:rPr lang="en-US"/>
+              <a:rPr lang="en-US" smtClean="0"/>
               <a:t>Click to edit Master text styles</a:t>
             </a:r>
           </a:p>
@@ -1723,37 +1721,38 @@
           <a:p>
             <a:pPr lvl="0"/>
             <a:r>
-              <a:rPr lang="en-US"/>
+              <a:rPr lang="en-US" smtClean="0"/>
               <a:t>Click to edit Master text styles</a:t>
             </a:r>
           </a:p>
           <a:p>
             <a:pPr lvl="1"/>
             <a:r>
-              <a:rPr lang="en-US"/>
+              <a:rPr lang="en-US" smtClean="0"/>
               <a:t>Second level</a:t>
             </a:r>
           </a:p>
           <a:p>
             <a:pPr lvl="2"/>
             <a:r>
-              <a:rPr lang="en-US"/>
+              <a:rPr lang="en-US" smtClean="0"/>
               <a:t>Third level</a:t>
             </a:r>
           </a:p>
           <a:p>
             <a:pPr lvl="3"/>
             <a:r>
-              <a:rPr lang="en-US"/>
+              <a:rPr lang="en-US" smtClean="0"/>
               <a:t>Fourth level</a:t>
             </a:r>
           </a:p>
           <a:p>
             <a:pPr lvl="4"/>
             <a:r>
-              <a:rPr lang="en-US"/>
+              <a:rPr lang="en-US" smtClean="0"/>
               <a:t>Fifth level</a:t>
             </a:r>
+            <a:endParaRPr lang="en-US"/>
           </a:p>
         </p:txBody>
       </p:sp>
@@ -1774,7 +1773,7 @@
           <a:p>
             <a:fld id="{5BCAD085-E8A6-8845-BD4E-CB4CCA059FC4}" type="datetimeFigureOut">
               <a:rPr lang="en-US" smtClean="0"/>
-              <a:t>10/24/2025</a:t>
+              <a:t>1/27/13</a:t>
             </a:fld>
             <a:endParaRPr lang="en-US"/>
           </a:p>
@@ -1868,9 +1867,10 @@
           <a:lstStyle/>
           <a:p>
             <a:r>
-              <a:rPr lang="en-US"/>
+              <a:rPr lang="en-US" smtClean="0"/>
               <a:t>Click to edit Master title style</a:t>
             </a:r>
+            <a:endParaRPr lang="en-US"/>
           </a:p>
         </p:txBody>
       </p:sp>
@@ -1891,7 +1891,7 @@
           <a:p>
             <a:fld id="{5BCAD085-E8A6-8845-BD4E-CB4CCA059FC4}" type="datetimeFigureOut">
               <a:rPr lang="en-US" smtClean="0"/>
-              <a:t>10/24/2025</a:t>
+              <a:t>1/27/13</a:t>
             </a:fld>
             <a:endParaRPr lang="en-US"/>
           </a:p>
@@ -1986,7 +1986,7 @@
           <a:p>
             <a:fld id="{5BCAD085-E8A6-8845-BD4E-CB4CCA059FC4}" type="datetimeFigureOut">
               <a:rPr lang="en-US" smtClean="0"/>
-              <a:t>10/24/2025</a:t>
+              <a:t>1/27/13</a:t>
             </a:fld>
             <a:endParaRPr lang="en-US"/>
           </a:p>
@@ -2089,9 +2089,10 @@
           </a:lstStyle>
           <a:p>
             <a:r>
-              <a:rPr lang="en-US"/>
+              <a:rPr lang="en-US" smtClean="0"/>
               <a:t>Click to edit Master title style</a:t>
             </a:r>
+            <a:endParaRPr lang="en-US"/>
           </a:p>
         </p:txBody>
       </p:sp>
@@ -2145,37 +2146,38 @@
           <a:p>
             <a:pPr lvl="0"/>
             <a:r>
-              <a:rPr lang="en-US"/>
+              <a:rPr lang="en-US" smtClean="0"/>
               <a:t>Click to edit Master text styles</a:t>
             </a:r>
           </a:p>
           <a:p>
             <a:pPr lvl="1"/>
             <a:r>
-              <a:rPr lang="en-US"/>
+              <a:rPr lang="en-US" smtClean="0"/>
               <a:t>Second level</a:t>
             </a:r>
           </a:p>
           <a:p>
             <a:pPr lvl="2"/>
             <a:r>
-              <a:rPr lang="en-US"/>
+              <a:rPr lang="en-US" smtClean="0"/>
               <a:t>Third level</a:t>
             </a:r>
           </a:p>
           <a:p>
             <a:pPr lvl="3"/>
             <a:r>
-              <a:rPr lang="en-US"/>
+              <a:rPr lang="en-US" smtClean="0"/>
               <a:t>Fourth level</a:t>
             </a:r>
           </a:p>
           <a:p>
             <a:pPr lvl="4"/>
             <a:r>
-              <a:rPr lang="en-US"/>
+              <a:rPr lang="en-US" smtClean="0"/>
               <a:t>Fifth level</a:t>
             </a:r>
+            <a:endParaRPr lang="en-US"/>
           </a:p>
         </p:txBody>
       </p:sp>
@@ -2238,7 +2240,7 @@
           <a:p>
             <a:pPr lvl="0"/>
             <a:r>
-              <a:rPr lang="en-US"/>
+              <a:rPr lang="en-US" smtClean="0"/>
               <a:t>Click to edit Master text styles</a:t>
             </a:r>
           </a:p>
@@ -2261,7 +2263,7 @@
           <a:p>
             <a:fld id="{5BCAD085-E8A6-8845-BD4E-CB4CCA059FC4}" type="datetimeFigureOut">
               <a:rPr lang="en-US" smtClean="0"/>
-              <a:t>10/24/2025</a:t>
+              <a:t>1/27/13</a:t>
             </a:fld>
             <a:endParaRPr lang="en-US"/>
           </a:p>
@@ -2364,9 +2366,10 @@
           </a:lstStyle>
           <a:p>
             <a:r>
-              <a:rPr lang="en-US"/>
+              <a:rPr lang="en-US" smtClean="0"/>
               <a:t>Click to edit Master title style</a:t>
             </a:r>
+            <a:endParaRPr lang="en-US"/>
           </a:p>
         </p:txBody>
       </p:sp>
@@ -2490,7 +2493,7 @@
           <a:p>
             <a:pPr lvl="0"/>
             <a:r>
-              <a:rPr lang="en-US"/>
+              <a:rPr lang="en-US" smtClean="0"/>
               <a:t>Click to edit Master text styles</a:t>
             </a:r>
           </a:p>
@@ -2513,7 +2516,7 @@
           <a:p>
             <a:fld id="{5BCAD085-E8A6-8845-BD4E-CB4CCA059FC4}" type="datetimeFigureOut">
               <a:rPr lang="en-US" smtClean="0"/>
-              <a:t>10/24/2025</a:t>
+              <a:t>1/27/13</a:t>
             </a:fld>
             <a:endParaRPr lang="en-US"/>
           </a:p>
@@ -2622,9 +2625,10 @@
           <a:lstStyle/>
           <a:p>
             <a:r>
-              <a:rPr lang="en-US"/>
+              <a:rPr lang="en-US" smtClean="0"/>
               <a:t>Click to edit Master title style</a:t>
             </a:r>
+            <a:endParaRPr lang="en-US"/>
           </a:p>
         </p:txBody>
       </p:sp>
@@ -2655,37 +2659,38 @@
           <a:p>
             <a:pPr lvl="0"/>
             <a:r>
-              <a:rPr lang="en-US"/>
+              <a:rPr lang="en-US" smtClean="0"/>
               <a:t>Click to edit Master text styles</a:t>
             </a:r>
           </a:p>
           <a:p>
             <a:pPr lvl="1"/>
             <a:r>
-              <a:rPr lang="en-US"/>
+              <a:rPr lang="en-US" smtClean="0"/>
               <a:t>Second level</a:t>
             </a:r>
           </a:p>
           <a:p>
             <a:pPr lvl="2"/>
             <a:r>
-              <a:rPr lang="en-US"/>
+              <a:rPr lang="en-US" smtClean="0"/>
               <a:t>Third level</a:t>
             </a:r>
           </a:p>
           <a:p>
             <a:pPr lvl="3"/>
             <a:r>
-              <a:rPr lang="en-US"/>
+              <a:rPr lang="en-US" smtClean="0"/>
               <a:t>Fourth level</a:t>
             </a:r>
           </a:p>
           <a:p>
             <a:pPr lvl="4"/>
             <a:r>
-              <a:rPr lang="en-US"/>
+              <a:rPr lang="en-US" smtClean="0"/>
               <a:t>Fifth level</a:t>
             </a:r>
+            <a:endParaRPr lang="en-US"/>
           </a:p>
         </p:txBody>
       </p:sp>
@@ -2724,7 +2729,7 @@
           <a:p>
             <a:fld id="{5BCAD085-E8A6-8845-BD4E-CB4CCA059FC4}" type="datetimeFigureOut">
               <a:rPr lang="en-US" smtClean="0"/>
-              <a:t>10/24/2025</a:t>
+              <a:t>1/27/13</a:t>
             </a:fld>
             <a:endParaRPr lang="en-US"/>
           </a:p>
@@ -3083,7 +3088,7 @@
 </file>
 
 <file path=ppt/slides/slide1.xml><?xml version="1.0" encoding="utf-8"?>
-<p:sld xmlns:a="http://schemas.openxmlformats.org/drawingml/2006/main" xmlns:r="http://schemas.openxmlformats.org/officeDocument/2006/relationships" xmlns:p="http://schemas.openxmlformats.org/presentationml/2006/main">
+<p:sld xmlns:a="http://schemas.openxmlformats.org/drawingml/2006/main" xmlns:p="http://schemas.openxmlformats.org/presentationml/2006/main" xmlns:r="http://schemas.openxmlformats.org/officeDocument/2006/relationships">
   <p:cSld>
     <p:spTree>
       <p:nvGrpSpPr>
@@ -3091,14 +3096,7 @@
         <p:cNvGrpSpPr/>
         <p:nvPr/>
       </p:nvGrpSpPr>
-      <p:grpSpPr>
-        <a:xfrm>
-          <a:off x="0" y="0"/>
-          <a:ext cx="0" cy="0"/>
-          <a:chOff x="0" y="0"/>
-          <a:chExt cx="0" cy="0"/>
-        </a:xfrm>
-      </p:grpSpPr>
+      <p:grpSpPr/>
       <p:sp>
         <p:nvSpPr>
           <p:cNvPr id="2" name="Title 1"/>
@@ -3165,7 +3163,7 @@
 </file>
 
 <file path=ppt/slides/slide10.xml><?xml version="1.0" encoding="utf-8"?>
-<p:sld xmlns:a="http://schemas.openxmlformats.org/drawingml/2006/main" xmlns:r="http://schemas.openxmlformats.org/officeDocument/2006/relationships" xmlns:p="http://schemas.openxmlformats.org/presentationml/2006/main">
+<p:sld xmlns:a="http://schemas.openxmlformats.org/drawingml/2006/main" xmlns:p="http://schemas.openxmlformats.org/presentationml/2006/main" xmlns:r="http://schemas.openxmlformats.org/officeDocument/2006/relationships">
   <p:cSld>
     <p:spTree>
       <p:nvGrpSpPr>
@@ -3173,14 +3171,7 @@
         <p:cNvGrpSpPr/>
         <p:nvPr/>
       </p:nvGrpSpPr>
-      <p:grpSpPr>
-        <a:xfrm>
-          <a:off x="0" y="0"/>
-          <a:ext cx="0" cy="0"/>
-          <a:chOff x="0" y="0"/>
-          <a:chExt cx="0" cy="0"/>
-        </a:xfrm>
-      </p:grpSpPr>
+      <p:grpSpPr/>
       <p:sp>
         <p:nvSpPr>
           <p:cNvPr id="2" name="Title 1"/>
@@ -3212,41 +3203,22 @@
             <p:ph idx="1"/>
           </p:nvPr>
         </p:nvSpPr>
-        <p:spPr>
-          <a:xfrm>
-            <a:off x="457200" y="1517073"/>
-            <a:ext cx="8229600" cy="4525963"/>
-          </a:xfrm>
-        </p:spPr>
-        <p:txBody>
-          <a:bodyPr>
-            <a:normAutofit fontScale="92500" lnSpcReduction="20000"/>
-          </a:bodyPr>
-          <a:lstStyle/>
-          <a:p>
-            <a:pPr marL="0" indent="0">
-              <a:buNone/>
-            </a:pPr>
-            <a:r>
-              <a:rPr dirty="0"/>
+        <p:spPr/>
+        <p:txBody>
+          <a:bodyPr/>
+          <a:lstStyle/>
+          <a:p>
+            <a:r>
               <a:t>• World Health Organization. (2023). Social determinants of health. Retrieved from https://www.who.int/health-topics/social-determinants-of-health</a:t>
             </a:r>
           </a:p>
           <a:p>
-            <a:pPr marL="0" indent="0">
-              <a:buNone/>
-            </a:pPr>
-            <a:r>
-              <a:rPr dirty="0"/>
+            <a:r>
               <a:t>• Centers for Disease Control and Prevention. (2024). Social Determinants of Health (SDOH). Retrieved from https://www.cdc.gov/socialdeterminants/index.html</a:t>
             </a:r>
           </a:p>
           <a:p>
-            <a:pPr marL="0" indent="0">
-              <a:buNone/>
-            </a:pPr>
-            <a:r>
-              <a:rPr dirty="0"/>
+            <a:r>
               <a:t>• Additional sources: Academic articles on cultural determinants (e.g., NCBI, Health Affairs).</a:t>
             </a:r>
           </a:p>
@@ -3261,7 +3233,7 @@
 </file>
 
 <file path=ppt/slides/slide2.xml><?xml version="1.0" encoding="utf-8"?>
-<p:sld xmlns:a="http://schemas.openxmlformats.org/drawingml/2006/main" xmlns:r="http://schemas.openxmlformats.org/officeDocument/2006/relationships" xmlns:p="http://schemas.openxmlformats.org/presentationml/2006/main">
+<p:sld xmlns:a="http://schemas.openxmlformats.org/drawingml/2006/main" xmlns:p="http://schemas.openxmlformats.org/presentationml/2006/main" xmlns:r="http://schemas.openxmlformats.org/officeDocument/2006/relationships">
   <p:cSld>
     <p:spTree>
       <p:nvGrpSpPr>
@@ -3269,14 +3241,7 @@
         <p:cNvGrpSpPr/>
         <p:nvPr/>
       </p:nvGrpSpPr>
-      <p:grpSpPr>
-        <a:xfrm>
-          <a:off x="0" y="0"/>
-          <a:ext cx="0" cy="0"/>
-          <a:chOff x="0" y="0"/>
-          <a:chExt cx="0" cy="0"/>
-        </a:xfrm>
-      </p:grpSpPr>
+      <p:grpSpPr/>
       <p:sp>
         <p:nvSpPr>
           <p:cNvPr id="2" name="Title 1"/>
@@ -3308,44 +3273,32 @@
             <p:ph idx="1"/>
           </p:nvPr>
         </p:nvSpPr>
-        <p:spPr>
-          <a:xfrm>
-            <a:off x="550718" y="1298864"/>
-            <a:ext cx="8229600" cy="4525963"/>
-          </a:xfrm>
-        </p:spPr>
-        <p:txBody>
-          <a:bodyPr>
-            <a:normAutofit fontScale="92500" lnSpcReduction="20000"/>
-          </a:bodyPr>
-          <a:lstStyle/>
-          <a:p>
-            <a:r>
-              <a:rPr dirty="0"/>
+        <p:spPr/>
+        <p:txBody>
+          <a:bodyPr/>
+          <a:lstStyle/>
+          <a:p>
+            <a:r>
               <a:t>By the end of this seminar, participants will be able to:</a:t>
             </a:r>
           </a:p>
           <a:p>
             <a:r>
-              <a:rPr dirty="0"/>
               <a:t>• Understand the definitions and concepts of social and cultural determinants of health and disease.</a:t>
             </a:r>
           </a:p>
           <a:p>
             <a:r>
-              <a:rPr dirty="0"/>
               <a:t>• Identify key factors influencing health outcomes based on literature and evidence.</a:t>
             </a:r>
           </a:p>
           <a:p>
             <a:r>
-              <a:rPr dirty="0"/>
               <a:t>• Analyze scientific data and information to arrive at logical conclusions.</a:t>
             </a:r>
           </a:p>
           <a:p>
             <a:r>
-              <a:rPr dirty="0"/>
               <a:t>• Discuss recommendations for addressing these determinants in public health practice.</a:t>
             </a:r>
           </a:p>
@@ -3360,7 +3313,7 @@
 </file>
 
 <file path=ppt/slides/slide3.xml><?xml version="1.0" encoding="utf-8"?>
-<p:sld xmlns:a="http://schemas.openxmlformats.org/drawingml/2006/main" xmlns:r="http://schemas.openxmlformats.org/officeDocument/2006/relationships" xmlns:p="http://schemas.openxmlformats.org/presentationml/2006/main">
+<p:sld xmlns:a="http://schemas.openxmlformats.org/drawingml/2006/main" xmlns:p="http://schemas.openxmlformats.org/presentationml/2006/main" xmlns:r="http://schemas.openxmlformats.org/officeDocument/2006/relationships">
   <p:cSld>
     <p:spTree>
       <p:nvGrpSpPr>
@@ -3368,14 +3321,7 @@
         <p:cNvGrpSpPr/>
         <p:nvPr/>
       </p:nvGrpSpPr>
-      <p:grpSpPr>
-        <a:xfrm>
-          <a:off x="0" y="0"/>
-          <a:ext cx="0" cy="0"/>
-          <a:chOff x="0" y="0"/>
-          <a:chExt cx="0" cy="0"/>
-        </a:xfrm>
-      </p:grpSpPr>
+      <p:grpSpPr/>
       <p:sp>
         <p:nvSpPr>
           <p:cNvPr id="2" name="Title 1"/>
@@ -3457,7 +3403,7 @@
 </file>
 
 <file path=ppt/slides/slide4.xml><?xml version="1.0" encoding="utf-8"?>
-<p:sld xmlns:a="http://schemas.openxmlformats.org/drawingml/2006/main" xmlns:r="http://schemas.openxmlformats.org/officeDocument/2006/relationships" xmlns:p="http://schemas.openxmlformats.org/presentationml/2006/main">
+<p:sld xmlns:a="http://schemas.openxmlformats.org/drawingml/2006/main" xmlns:p="http://schemas.openxmlformats.org/presentationml/2006/main" xmlns:r="http://schemas.openxmlformats.org/officeDocument/2006/relationships">
   <p:cSld>
     <p:spTree>
       <p:nvGrpSpPr>
@@ -3465,14 +3411,7 @@
         <p:cNvGrpSpPr/>
         <p:nvPr/>
       </p:nvGrpSpPr>
-      <p:grpSpPr>
-        <a:xfrm>
-          <a:off x="0" y="0"/>
-          <a:ext cx="0" cy="0"/>
-          <a:chOff x="0" y="0"/>
-          <a:chExt cx="0" cy="0"/>
-        </a:xfrm>
-      </p:grpSpPr>
+      <p:grpSpPr/>
       <p:sp>
         <p:nvSpPr>
           <p:cNvPr id="2" name="Title 1"/>
@@ -3539,7 +3478,7 @@
 </file>
 
 <file path=ppt/slides/slide5.xml><?xml version="1.0" encoding="utf-8"?>
-<p:sld xmlns:a="http://schemas.openxmlformats.org/drawingml/2006/main" xmlns:r="http://schemas.openxmlformats.org/officeDocument/2006/relationships" xmlns:p="http://schemas.openxmlformats.org/presentationml/2006/main">
+<p:sld xmlns:a="http://schemas.openxmlformats.org/drawingml/2006/main" xmlns:p="http://schemas.openxmlformats.org/presentationml/2006/main" xmlns:r="http://schemas.openxmlformats.org/officeDocument/2006/relationships">
   <p:cSld>
     <p:spTree>
       <p:nvGrpSpPr>
@@ -3547,14 +3486,7 @@
         <p:cNvGrpSpPr/>
         <p:nvPr/>
       </p:nvGrpSpPr>
-      <p:grpSpPr>
-        <a:xfrm>
-          <a:off x="0" y="0"/>
-          <a:ext cx="0" cy="0"/>
-          <a:chOff x="0" y="0"/>
-          <a:chExt cx="0" cy="0"/>
-        </a:xfrm>
-      </p:grpSpPr>
+      <p:grpSpPr/>
       <p:sp>
         <p:nvSpPr>
           <p:cNvPr id="2" name="Title 1"/>
@@ -3631,7 +3563,7 @@
 </file>
 
 <file path=ppt/slides/slide6.xml><?xml version="1.0" encoding="utf-8"?>
-<p:sld xmlns:a="http://schemas.openxmlformats.org/drawingml/2006/main" xmlns:r="http://schemas.openxmlformats.org/officeDocument/2006/relationships" xmlns:p="http://schemas.openxmlformats.org/presentationml/2006/main">
+<p:sld xmlns:a="http://schemas.openxmlformats.org/drawingml/2006/main" xmlns:p="http://schemas.openxmlformats.org/presentationml/2006/main" xmlns:r="http://schemas.openxmlformats.org/officeDocument/2006/relationships">
   <p:cSld>
     <p:spTree>
       <p:nvGrpSpPr>
@@ -3639,14 +3571,7 @@
         <p:cNvGrpSpPr/>
         <p:nvPr/>
       </p:nvGrpSpPr>
-      <p:grpSpPr>
-        <a:xfrm>
-          <a:off x="0" y="0"/>
-          <a:ext cx="0" cy="0"/>
-          <a:chOff x="0" y="0"/>
-          <a:chExt cx="0" cy="0"/>
-        </a:xfrm>
-      </p:grpSpPr>
+      <p:grpSpPr/>
       <p:sp>
         <p:nvSpPr>
           <p:cNvPr id="2" name="Title 1"/>
@@ -3723,7 +3648,7 @@
 </file>
 
 <file path=ppt/slides/slide7.xml><?xml version="1.0" encoding="utf-8"?>
-<p:sld xmlns:a="http://schemas.openxmlformats.org/drawingml/2006/main" xmlns:r="http://schemas.openxmlformats.org/officeDocument/2006/relationships" xmlns:p="http://schemas.openxmlformats.org/presentationml/2006/main">
+<p:sld xmlns:a="http://schemas.openxmlformats.org/drawingml/2006/main" xmlns:p="http://schemas.openxmlformats.org/presentationml/2006/main" xmlns:r="http://schemas.openxmlformats.org/officeDocument/2006/relationships">
   <p:cSld>
     <p:spTree>
       <p:nvGrpSpPr>
@@ -3731,14 +3656,7 @@
         <p:cNvGrpSpPr/>
         <p:nvPr/>
       </p:nvGrpSpPr>
-      <p:grpSpPr>
-        <a:xfrm>
-          <a:off x="0" y="0"/>
-          <a:ext cx="0" cy="0"/>
-          <a:chOff x="0" y="0"/>
-          <a:chExt cx="0" cy="0"/>
-        </a:xfrm>
-      </p:grpSpPr>
+      <p:grpSpPr/>
       <p:sp>
         <p:nvSpPr>
           <p:cNvPr id="2" name="Title 1"/>
@@ -3815,7 +3733,7 @@
 </file>
 
 <file path=ppt/slides/slide8.xml><?xml version="1.0" encoding="utf-8"?>
-<p:sld xmlns:a="http://schemas.openxmlformats.org/drawingml/2006/main" xmlns:r="http://schemas.openxmlformats.org/officeDocument/2006/relationships" xmlns:p="http://schemas.openxmlformats.org/presentationml/2006/main">
+<p:sld xmlns:a="http://schemas.openxmlformats.org/drawingml/2006/main" xmlns:p="http://schemas.openxmlformats.org/presentationml/2006/main" xmlns:r="http://schemas.openxmlformats.org/officeDocument/2006/relationships">
   <p:cSld>
     <p:spTree>
       <p:nvGrpSpPr>
@@ -3823,14 +3741,7 @@
         <p:cNvGrpSpPr/>
         <p:nvPr/>
       </p:nvGrpSpPr>
-      <p:grpSpPr>
-        <a:xfrm>
-          <a:off x="0" y="0"/>
-          <a:ext cx="0" cy="0"/>
-          <a:chOff x="0" y="0"/>
-          <a:chExt cx="0" cy="0"/>
-        </a:xfrm>
-      </p:grpSpPr>
+      <p:grpSpPr/>
       <p:sp>
         <p:nvSpPr>
           <p:cNvPr id="2" name="Title 1"/>
@@ -3897,7 +3808,7 @@
 </file>
 
 <file path=ppt/slides/slide9.xml><?xml version="1.0" encoding="utf-8"?>
-<p:sld xmlns:a="http://schemas.openxmlformats.org/drawingml/2006/main" xmlns:r="http://schemas.openxmlformats.org/officeDocument/2006/relationships" xmlns:p="http://schemas.openxmlformats.org/presentationml/2006/main">
+<p:sld xmlns:a="http://schemas.openxmlformats.org/drawingml/2006/main" xmlns:p="http://schemas.openxmlformats.org/presentationml/2006/main" xmlns:r="http://schemas.openxmlformats.org/officeDocument/2006/relationships">
   <p:cSld>
     <p:spTree>
       <p:nvGrpSpPr>
@@ -3905,14 +3816,7 @@
         <p:cNvGrpSpPr/>
         <p:nvPr/>
       </p:nvGrpSpPr>
-      <p:grpSpPr>
-        <a:xfrm>
-          <a:off x="0" y="0"/>
-          <a:ext cx="0" cy="0"/>
-          <a:chOff x="0" y="0"/>
-          <a:chExt cx="0" cy="0"/>
-        </a:xfrm>
-      </p:grpSpPr>
+      <p:grpSpPr/>
       <p:sp>
         <p:nvSpPr>
           <p:cNvPr id="2" name="Title 1"/>

</xml_diff>